<commit_message>
Update LabSession0 - Initial Setup.pptx
</commit_message>
<xml_diff>
--- a/LabSession0 - Initial Setup.pptx
+++ b/LabSession0 - Initial Setup.pptx
@@ -6,13 +6,18 @@
     <p:sldMasterId id="2147483672" r:id="rId2"/>
   </p:sldMasterIdLst>
   <p:notesMasterIdLst>
-    <p:notesMasterId r:id="rId7"/>
+    <p:notesMasterId r:id="rId12"/>
   </p:notesMasterIdLst>
   <p:sldIdLst>
     <p:sldId id="256" r:id="rId3"/>
     <p:sldId id="302" r:id="rId4"/>
     <p:sldId id="303" r:id="rId5"/>
     <p:sldId id="304" r:id="rId6"/>
+    <p:sldId id="305" r:id="rId7"/>
+    <p:sldId id="306" r:id="rId8"/>
+    <p:sldId id="307" r:id="rId9"/>
+    <p:sldId id="308" r:id="rId10"/>
+    <p:sldId id="309" r:id="rId11"/>
   </p:sldIdLst>
   <p:sldSz cx="9144000" cy="6858000" type="screen4x3"/>
   <p:notesSz cx="6858000" cy="9144000"/>
@@ -120,6 +125,11 @@
             <p14:sldId id="302"/>
             <p14:sldId id="303"/>
             <p14:sldId id="304"/>
+            <p14:sldId id="305"/>
+            <p14:sldId id="306"/>
+            <p14:sldId id="307"/>
+            <p14:sldId id="308"/>
+            <p14:sldId id="309"/>
           </p14:sldIdLst>
         </p14:section>
       </p14:sectionLst>
@@ -640,6 +650,90 @@
     <p:extLst>
       <p:ext uri="{BB962C8B-B14F-4D97-AF65-F5344CB8AC3E}">
         <p14:creationId xmlns:p14="http://schemas.microsoft.com/office/powerpoint/2010/main" val="3693777848"/>
+      </p:ext>
+    </p:extLst>
+  </p:cSld>
+  <p:clrMapOvr>
+    <a:masterClrMapping/>
+  </p:clrMapOvr>
+</p:notes>
+</file>
+
+<file path=ppt/notesSlides/notesSlide3.xml><?xml version="1.0" encoding="utf-8"?>
+<p:notes xmlns:a="http://schemas.openxmlformats.org/drawingml/2006/main" xmlns:r="http://schemas.openxmlformats.org/officeDocument/2006/relationships" xmlns:p="http://schemas.openxmlformats.org/presentationml/2006/main">
+  <p:cSld>
+    <p:spTree>
+      <p:nvGrpSpPr>
+        <p:cNvPr id="1" name=""/>
+        <p:cNvGrpSpPr/>
+        <p:nvPr/>
+      </p:nvGrpSpPr>
+      <p:grpSpPr>
+        <a:xfrm>
+          <a:off x="0" y="0"/>
+          <a:ext cx="0" cy="0"/>
+          <a:chOff x="0" y="0"/>
+          <a:chExt cx="0" cy="0"/>
+        </a:xfrm>
+      </p:grpSpPr>
+      <p:sp>
+        <p:nvSpPr>
+          <p:cNvPr id="2" name="Segnaposto immagine diapositiva 1"/>
+          <p:cNvSpPr>
+            <a:spLocks noGrp="1" noRot="1" noChangeAspect="1"/>
+          </p:cNvSpPr>
+          <p:nvPr>
+            <p:ph type="sldImg"/>
+          </p:nvPr>
+        </p:nvSpPr>
+        <p:spPr/>
+      </p:sp>
+      <p:sp>
+        <p:nvSpPr>
+          <p:cNvPr id="3" name="Segnaposto note 2"/>
+          <p:cNvSpPr>
+            <a:spLocks noGrp="1"/>
+          </p:cNvSpPr>
+          <p:nvPr>
+            <p:ph type="body" idx="1"/>
+          </p:nvPr>
+        </p:nvSpPr>
+        <p:spPr/>
+        <p:txBody>
+          <a:bodyPr/>
+          <a:lstStyle/>
+          <a:p>
+            <a:endParaRPr lang="en-GB" dirty="0"/>
+          </a:p>
+        </p:txBody>
+      </p:sp>
+      <p:sp>
+        <p:nvSpPr>
+          <p:cNvPr id="4" name="Segnaposto numero diapositiva 3"/>
+          <p:cNvSpPr>
+            <a:spLocks noGrp="1"/>
+          </p:cNvSpPr>
+          <p:nvPr>
+            <p:ph type="sldNum" sz="quarter" idx="5"/>
+          </p:nvPr>
+        </p:nvSpPr>
+        <p:spPr/>
+        <p:txBody>
+          <a:bodyPr/>
+          <a:lstStyle/>
+          <a:p>
+            <a:fld id="{579EA76A-0A3F-4C6E-BCAD-3645DACBB6C6}" type="slidenum">
+              <a:rPr lang="en-US" smtClean="0"/>
+              <a:t>5</a:t>
+            </a:fld>
+            <a:endParaRPr lang="en-US"/>
+          </a:p>
+        </p:txBody>
+      </p:sp>
+    </p:spTree>
+    <p:extLst>
+      <p:ext uri="{BB962C8B-B14F-4D97-AF65-F5344CB8AC3E}">
+        <p14:creationId xmlns:p14="http://schemas.microsoft.com/office/powerpoint/2010/main" val="571056939"/>
       </p:ext>
     </p:extLst>
   </p:cSld>
@@ -7926,6 +8020,765 @@
     <p:extLst>
       <p:ext uri="{BB962C8B-B14F-4D97-AF65-F5344CB8AC3E}">
         <p14:creationId xmlns:p14="http://schemas.microsoft.com/office/powerpoint/2010/main" val="3516899283"/>
+      </p:ext>
+    </p:extLst>
+  </p:cSld>
+  <p:clrMapOvr>
+    <a:masterClrMapping/>
+  </p:clrMapOvr>
+</p:sld>
+</file>
+
+<file path=ppt/slides/slide5.xml><?xml version="1.0" encoding="utf-8"?>
+<p:sld xmlns:a="http://schemas.openxmlformats.org/drawingml/2006/main" xmlns:r="http://schemas.openxmlformats.org/officeDocument/2006/relationships" xmlns:p="http://schemas.openxmlformats.org/presentationml/2006/main">
+  <p:cSld>
+    <p:spTree>
+      <p:nvGrpSpPr>
+        <p:cNvPr id="1" name=""/>
+        <p:cNvGrpSpPr/>
+        <p:nvPr/>
+      </p:nvGrpSpPr>
+      <p:grpSpPr>
+        <a:xfrm>
+          <a:off x="0" y="0"/>
+          <a:ext cx="0" cy="0"/>
+          <a:chOff x="0" y="0"/>
+          <a:chExt cx="0" cy="0"/>
+        </a:xfrm>
+      </p:grpSpPr>
+      <p:sp>
+        <p:nvSpPr>
+          <p:cNvPr id="2" name="Titolo 1">
+            <a:extLst>
+              <a:ext uri="{FF2B5EF4-FFF2-40B4-BE49-F238E27FC236}">
+                <a16:creationId xmlns:a16="http://schemas.microsoft.com/office/drawing/2014/main" id="{445714CA-E0DE-4A06-983D-E6FCA0D880D9}"/>
+              </a:ext>
+            </a:extLst>
+          </p:cNvPr>
+          <p:cNvSpPr>
+            <a:spLocks noGrp="1"/>
+          </p:cNvSpPr>
+          <p:nvPr>
+            <p:ph type="title"/>
+          </p:nvPr>
+        </p:nvSpPr>
+        <p:spPr>
+          <a:xfrm>
+            <a:off x="411892" y="365127"/>
+            <a:ext cx="7759722" cy="846292"/>
+          </a:xfrm>
+        </p:spPr>
+        <p:txBody>
+          <a:bodyPr>
+            <a:normAutofit fontScale="90000"/>
+          </a:bodyPr>
+          <a:lstStyle/>
+          <a:p>
+            <a:r>
+              <a:rPr lang="en-GB" dirty="0"/>
+              <a:t>Step 3: Install Python Libraries with pip</a:t>
+            </a:r>
+          </a:p>
+        </p:txBody>
+      </p:sp>
+      <p:sp>
+        <p:nvSpPr>
+          <p:cNvPr id="3" name="Segnaposto contenuto 2">
+            <a:extLst>
+              <a:ext uri="{FF2B5EF4-FFF2-40B4-BE49-F238E27FC236}">
+                <a16:creationId xmlns:a16="http://schemas.microsoft.com/office/drawing/2014/main" id="{88DDDFFD-4EB5-4D54-81DA-19CDFC81B261}"/>
+              </a:ext>
+            </a:extLst>
+          </p:cNvPr>
+          <p:cNvSpPr>
+            <a:spLocks noGrp="1"/>
+          </p:cNvSpPr>
+          <p:nvPr>
+            <p:ph idx="1"/>
+          </p:nvPr>
+        </p:nvSpPr>
+        <p:spPr/>
+        <p:txBody>
+          <a:bodyPr/>
+          <a:lstStyle/>
+          <a:p>
+            <a:endParaRPr lang="en-GB"/>
+          </a:p>
+        </p:txBody>
+      </p:sp>
+      <p:sp>
+        <p:nvSpPr>
+          <p:cNvPr id="4" name="Segnaposto data 3">
+            <a:extLst>
+              <a:ext uri="{FF2B5EF4-FFF2-40B4-BE49-F238E27FC236}">
+                <a16:creationId xmlns:a16="http://schemas.microsoft.com/office/drawing/2014/main" id="{A14690C0-4DA6-4DF9-A98F-99EAD8A70AC0}"/>
+              </a:ext>
+            </a:extLst>
+          </p:cNvPr>
+          <p:cNvSpPr>
+            <a:spLocks noGrp="1"/>
+          </p:cNvSpPr>
+          <p:nvPr>
+            <p:ph type="dt" sz="half" idx="10"/>
+          </p:nvPr>
+        </p:nvSpPr>
+        <p:spPr>
+          <a:xfrm>
+            <a:off x="411891" y="6361329"/>
+            <a:ext cx="2541664" cy="365125"/>
+          </a:xfrm>
+        </p:spPr>
+        <p:txBody>
+          <a:bodyPr/>
+          <a:lstStyle/>
+          <a:p>
+            <a:r>
+              <a:rPr lang="en-US" dirty="0"/>
+              <a:t>Initial Setup – Pierluigi Zama Ramirez</a:t>
+            </a:r>
+          </a:p>
+        </p:txBody>
+      </p:sp>
+      <p:sp>
+        <p:nvSpPr>
+          <p:cNvPr id="5" name="Segnaposto numero diapositiva 4">
+            <a:extLst>
+              <a:ext uri="{FF2B5EF4-FFF2-40B4-BE49-F238E27FC236}">
+                <a16:creationId xmlns:a16="http://schemas.microsoft.com/office/drawing/2014/main" id="{385B2656-64C8-4519-8F81-7859234441B1}"/>
+              </a:ext>
+            </a:extLst>
+          </p:cNvPr>
+          <p:cNvSpPr>
+            <a:spLocks noGrp="1"/>
+          </p:cNvSpPr>
+          <p:nvPr>
+            <p:ph type="sldNum" sz="quarter" idx="12"/>
+          </p:nvPr>
+        </p:nvSpPr>
+        <p:spPr/>
+        <p:txBody>
+          <a:bodyPr/>
+          <a:lstStyle/>
+          <a:p>
+            <a:fld id="{21D15A9C-11B4-4C77-BDEA-04E3D7D1DFC0}" type="slidenum">
+              <a:rPr lang="en-US" smtClean="0"/>
+              <a:t>5</a:t>
+            </a:fld>
+            <a:endParaRPr lang="en-US"/>
+          </a:p>
+        </p:txBody>
+      </p:sp>
+    </p:spTree>
+    <p:extLst>
+      <p:ext uri="{BB962C8B-B14F-4D97-AF65-F5344CB8AC3E}">
+        <p14:creationId xmlns:p14="http://schemas.microsoft.com/office/powerpoint/2010/main" val="2096771471"/>
+      </p:ext>
+    </p:extLst>
+  </p:cSld>
+  <p:clrMapOvr>
+    <a:masterClrMapping/>
+  </p:clrMapOvr>
+</p:sld>
+</file>
+
+<file path=ppt/slides/slide6.xml><?xml version="1.0" encoding="utf-8"?>
+<p:sld xmlns:a="http://schemas.openxmlformats.org/drawingml/2006/main" xmlns:r="http://schemas.openxmlformats.org/officeDocument/2006/relationships" xmlns:p="http://schemas.openxmlformats.org/presentationml/2006/main">
+  <p:cSld>
+    <p:spTree>
+      <p:nvGrpSpPr>
+        <p:cNvPr id="1" name=""/>
+        <p:cNvGrpSpPr/>
+        <p:nvPr/>
+      </p:nvGrpSpPr>
+      <p:grpSpPr>
+        <a:xfrm>
+          <a:off x="0" y="0"/>
+          <a:ext cx="0" cy="0"/>
+          <a:chOff x="0" y="0"/>
+          <a:chExt cx="0" cy="0"/>
+        </a:xfrm>
+      </p:grpSpPr>
+      <p:sp>
+        <p:nvSpPr>
+          <p:cNvPr id="2" name="Titolo 1">
+            <a:extLst>
+              <a:ext uri="{FF2B5EF4-FFF2-40B4-BE49-F238E27FC236}">
+                <a16:creationId xmlns:a16="http://schemas.microsoft.com/office/drawing/2014/main" id="{C2425517-4760-4CAE-AE51-2926BAC8F809}"/>
+              </a:ext>
+            </a:extLst>
+          </p:cNvPr>
+          <p:cNvSpPr>
+            <a:spLocks noGrp="1"/>
+          </p:cNvSpPr>
+          <p:nvPr>
+            <p:ph type="title"/>
+          </p:nvPr>
+        </p:nvSpPr>
+        <p:spPr/>
+        <p:txBody>
+          <a:bodyPr>
+            <a:normAutofit fontScale="90000"/>
+          </a:bodyPr>
+          <a:lstStyle/>
+          <a:p>
+            <a:r>
+              <a:rPr lang="en-GB" dirty="0"/>
+              <a:t>Step 4: Install and run </a:t>
+            </a:r>
+            <a:r>
+              <a:rPr lang="en-GB" dirty="0" err="1"/>
+              <a:t>Jupyter</a:t>
+            </a:r>
+            <a:r>
+              <a:rPr lang="en-GB" dirty="0"/>
+              <a:t> Notebook</a:t>
+            </a:r>
+          </a:p>
+        </p:txBody>
+      </p:sp>
+      <p:sp>
+        <p:nvSpPr>
+          <p:cNvPr id="3" name="Segnaposto contenuto 2">
+            <a:extLst>
+              <a:ext uri="{FF2B5EF4-FFF2-40B4-BE49-F238E27FC236}">
+                <a16:creationId xmlns:a16="http://schemas.microsoft.com/office/drawing/2014/main" id="{87EB0E7F-A70F-40D1-8E72-EC4A6A106225}"/>
+              </a:ext>
+            </a:extLst>
+          </p:cNvPr>
+          <p:cNvSpPr>
+            <a:spLocks noGrp="1"/>
+          </p:cNvSpPr>
+          <p:nvPr>
+            <p:ph idx="1"/>
+          </p:nvPr>
+        </p:nvSpPr>
+        <p:spPr/>
+        <p:txBody>
+          <a:bodyPr/>
+          <a:lstStyle/>
+          <a:p>
+            <a:endParaRPr lang="en-GB"/>
+          </a:p>
+        </p:txBody>
+      </p:sp>
+      <p:sp>
+        <p:nvSpPr>
+          <p:cNvPr id="4" name="Segnaposto data 3">
+            <a:extLst>
+              <a:ext uri="{FF2B5EF4-FFF2-40B4-BE49-F238E27FC236}">
+                <a16:creationId xmlns:a16="http://schemas.microsoft.com/office/drawing/2014/main" id="{CD37FF21-5647-48BC-ABE0-22F8AB863E52}"/>
+              </a:ext>
+            </a:extLst>
+          </p:cNvPr>
+          <p:cNvSpPr>
+            <a:spLocks noGrp="1"/>
+          </p:cNvSpPr>
+          <p:nvPr>
+            <p:ph type="dt" sz="half" idx="10"/>
+          </p:nvPr>
+        </p:nvSpPr>
+        <p:spPr>
+          <a:xfrm>
+            <a:off x="411891" y="6361329"/>
+            <a:ext cx="2558835" cy="365125"/>
+          </a:xfrm>
+        </p:spPr>
+        <p:txBody>
+          <a:bodyPr/>
+          <a:lstStyle/>
+          <a:p>
+            <a:r>
+              <a:rPr lang="en-US" dirty="0"/>
+              <a:t>Initial Setup – Pierluigi Zama Ramirez</a:t>
+            </a:r>
+          </a:p>
+        </p:txBody>
+      </p:sp>
+      <p:sp>
+        <p:nvSpPr>
+          <p:cNvPr id="5" name="Segnaposto numero diapositiva 4">
+            <a:extLst>
+              <a:ext uri="{FF2B5EF4-FFF2-40B4-BE49-F238E27FC236}">
+                <a16:creationId xmlns:a16="http://schemas.microsoft.com/office/drawing/2014/main" id="{1B67C968-09C6-409E-9094-6A61912F818E}"/>
+              </a:ext>
+            </a:extLst>
+          </p:cNvPr>
+          <p:cNvSpPr>
+            <a:spLocks noGrp="1"/>
+          </p:cNvSpPr>
+          <p:nvPr>
+            <p:ph type="sldNum" sz="quarter" idx="12"/>
+          </p:nvPr>
+        </p:nvSpPr>
+        <p:spPr/>
+        <p:txBody>
+          <a:bodyPr/>
+          <a:lstStyle/>
+          <a:p>
+            <a:fld id="{21D15A9C-11B4-4C77-BDEA-04E3D7D1DFC0}" type="slidenum">
+              <a:rPr lang="en-US" smtClean="0"/>
+              <a:t>6</a:t>
+            </a:fld>
+            <a:endParaRPr lang="en-US"/>
+          </a:p>
+        </p:txBody>
+      </p:sp>
+    </p:spTree>
+    <p:extLst>
+      <p:ext uri="{BB962C8B-B14F-4D97-AF65-F5344CB8AC3E}">
+        <p14:creationId xmlns:p14="http://schemas.microsoft.com/office/powerpoint/2010/main" val="2030660169"/>
+      </p:ext>
+    </p:extLst>
+  </p:cSld>
+  <p:clrMapOvr>
+    <a:masterClrMapping/>
+  </p:clrMapOvr>
+</p:sld>
+</file>
+
+<file path=ppt/slides/slide7.xml><?xml version="1.0" encoding="utf-8"?>
+<p:sld xmlns:a="http://schemas.openxmlformats.org/drawingml/2006/main" xmlns:r="http://schemas.openxmlformats.org/officeDocument/2006/relationships" xmlns:p="http://schemas.openxmlformats.org/presentationml/2006/main">
+  <p:cSld>
+    <p:spTree>
+      <p:nvGrpSpPr>
+        <p:cNvPr id="1" name=""/>
+        <p:cNvGrpSpPr/>
+        <p:nvPr/>
+      </p:nvGrpSpPr>
+      <p:grpSpPr>
+        <a:xfrm>
+          <a:off x="0" y="0"/>
+          <a:ext cx="0" cy="0"/>
+          <a:chOff x="0" y="0"/>
+          <a:chExt cx="0" cy="0"/>
+        </a:xfrm>
+      </p:grpSpPr>
+      <p:sp>
+        <p:nvSpPr>
+          <p:cNvPr id="2" name="Titolo 1">
+            <a:extLst>
+              <a:ext uri="{FF2B5EF4-FFF2-40B4-BE49-F238E27FC236}">
+                <a16:creationId xmlns:a16="http://schemas.microsoft.com/office/drawing/2014/main" id="{C2425517-4760-4CAE-AE51-2926BAC8F809}"/>
+              </a:ext>
+            </a:extLst>
+          </p:cNvPr>
+          <p:cNvSpPr>
+            <a:spLocks noGrp="1"/>
+          </p:cNvSpPr>
+          <p:nvPr>
+            <p:ph type="title"/>
+          </p:nvPr>
+        </p:nvSpPr>
+        <p:spPr/>
+        <p:txBody>
+          <a:bodyPr/>
+          <a:lstStyle/>
+          <a:p>
+            <a:r>
+              <a:rPr lang="en-GB" dirty="0" err="1"/>
+              <a:t>Jupyter</a:t>
+            </a:r>
+            <a:r>
+              <a:rPr lang="en-GB" dirty="0"/>
+              <a:t> Notebook: An overview</a:t>
+            </a:r>
+          </a:p>
+        </p:txBody>
+      </p:sp>
+      <p:sp>
+        <p:nvSpPr>
+          <p:cNvPr id="3" name="Segnaposto contenuto 2">
+            <a:extLst>
+              <a:ext uri="{FF2B5EF4-FFF2-40B4-BE49-F238E27FC236}">
+                <a16:creationId xmlns:a16="http://schemas.microsoft.com/office/drawing/2014/main" id="{87EB0E7F-A70F-40D1-8E72-EC4A6A106225}"/>
+              </a:ext>
+            </a:extLst>
+          </p:cNvPr>
+          <p:cNvSpPr>
+            <a:spLocks noGrp="1"/>
+          </p:cNvSpPr>
+          <p:nvPr>
+            <p:ph idx="1"/>
+          </p:nvPr>
+        </p:nvSpPr>
+        <p:spPr/>
+        <p:txBody>
+          <a:bodyPr/>
+          <a:lstStyle/>
+          <a:p>
+            <a:endParaRPr lang="en-GB"/>
+          </a:p>
+        </p:txBody>
+      </p:sp>
+      <p:sp>
+        <p:nvSpPr>
+          <p:cNvPr id="4" name="Segnaposto data 3">
+            <a:extLst>
+              <a:ext uri="{FF2B5EF4-FFF2-40B4-BE49-F238E27FC236}">
+                <a16:creationId xmlns:a16="http://schemas.microsoft.com/office/drawing/2014/main" id="{CD37FF21-5647-48BC-ABE0-22F8AB863E52}"/>
+              </a:ext>
+            </a:extLst>
+          </p:cNvPr>
+          <p:cNvSpPr>
+            <a:spLocks noGrp="1"/>
+          </p:cNvSpPr>
+          <p:nvPr>
+            <p:ph type="dt" sz="half" idx="10"/>
+          </p:nvPr>
+        </p:nvSpPr>
+        <p:spPr>
+          <a:xfrm>
+            <a:off x="411891" y="6361329"/>
+            <a:ext cx="2558835" cy="365125"/>
+          </a:xfrm>
+        </p:spPr>
+        <p:txBody>
+          <a:bodyPr/>
+          <a:lstStyle/>
+          <a:p>
+            <a:r>
+              <a:rPr lang="en-US" dirty="0"/>
+              <a:t>Initial Setup – Pierluigi Zama Ramirez</a:t>
+            </a:r>
+          </a:p>
+        </p:txBody>
+      </p:sp>
+      <p:sp>
+        <p:nvSpPr>
+          <p:cNvPr id="5" name="Segnaposto numero diapositiva 4">
+            <a:extLst>
+              <a:ext uri="{FF2B5EF4-FFF2-40B4-BE49-F238E27FC236}">
+                <a16:creationId xmlns:a16="http://schemas.microsoft.com/office/drawing/2014/main" id="{1B67C968-09C6-409E-9094-6A61912F818E}"/>
+              </a:ext>
+            </a:extLst>
+          </p:cNvPr>
+          <p:cNvSpPr>
+            <a:spLocks noGrp="1"/>
+          </p:cNvSpPr>
+          <p:nvPr>
+            <p:ph type="sldNum" sz="quarter" idx="12"/>
+          </p:nvPr>
+        </p:nvSpPr>
+        <p:spPr/>
+        <p:txBody>
+          <a:bodyPr/>
+          <a:lstStyle/>
+          <a:p>
+            <a:fld id="{21D15A9C-11B4-4C77-BDEA-04E3D7D1DFC0}" type="slidenum">
+              <a:rPr lang="en-US" smtClean="0"/>
+              <a:t>7</a:t>
+            </a:fld>
+            <a:endParaRPr lang="en-US"/>
+          </a:p>
+        </p:txBody>
+      </p:sp>
+    </p:spTree>
+    <p:extLst>
+      <p:ext uri="{BB962C8B-B14F-4D97-AF65-F5344CB8AC3E}">
+        <p14:creationId xmlns:p14="http://schemas.microsoft.com/office/powerpoint/2010/main" val="1499836088"/>
+      </p:ext>
+    </p:extLst>
+  </p:cSld>
+  <p:clrMapOvr>
+    <a:masterClrMapping/>
+  </p:clrMapOvr>
+</p:sld>
+</file>
+
+<file path=ppt/slides/slide8.xml><?xml version="1.0" encoding="utf-8"?>
+<p:sld xmlns:a="http://schemas.openxmlformats.org/drawingml/2006/main" xmlns:r="http://schemas.openxmlformats.org/officeDocument/2006/relationships" xmlns:p="http://schemas.openxmlformats.org/presentationml/2006/main">
+  <p:cSld>
+    <p:spTree>
+      <p:nvGrpSpPr>
+        <p:cNvPr id="1" name=""/>
+        <p:cNvGrpSpPr/>
+        <p:nvPr/>
+      </p:nvGrpSpPr>
+      <p:grpSpPr>
+        <a:xfrm>
+          <a:off x="0" y="0"/>
+          <a:ext cx="0" cy="0"/>
+          <a:chOff x="0" y="0"/>
+          <a:chExt cx="0" cy="0"/>
+        </a:xfrm>
+      </p:grpSpPr>
+      <p:sp>
+        <p:nvSpPr>
+          <p:cNvPr id="2" name="Titolo 1">
+            <a:extLst>
+              <a:ext uri="{FF2B5EF4-FFF2-40B4-BE49-F238E27FC236}">
+                <a16:creationId xmlns:a16="http://schemas.microsoft.com/office/drawing/2014/main" id="{C2425517-4760-4CAE-AE51-2926BAC8F809}"/>
+              </a:ext>
+            </a:extLst>
+          </p:cNvPr>
+          <p:cNvSpPr>
+            <a:spLocks noGrp="1"/>
+          </p:cNvSpPr>
+          <p:nvPr>
+            <p:ph type="title"/>
+          </p:nvPr>
+        </p:nvSpPr>
+        <p:spPr/>
+        <p:txBody>
+          <a:bodyPr/>
+          <a:lstStyle/>
+          <a:p>
+            <a:r>
+              <a:rPr lang="en-GB"/>
+              <a:t>Visual </a:t>
+            </a:r>
+            <a:r>
+              <a:rPr lang="en-GB" dirty="0"/>
+              <a:t>S</a:t>
+            </a:r>
+            <a:r>
+              <a:rPr lang="en-GB"/>
+              <a:t>tudio </a:t>
+            </a:r>
+            <a:r>
+              <a:rPr lang="en-GB" dirty="0"/>
+              <a:t>Code </a:t>
+            </a:r>
+            <a:r>
+              <a:rPr lang="en-GB"/>
+              <a:t>and terminal</a:t>
+            </a:r>
+          </a:p>
+        </p:txBody>
+      </p:sp>
+      <p:sp>
+        <p:nvSpPr>
+          <p:cNvPr id="3" name="Segnaposto contenuto 2">
+            <a:extLst>
+              <a:ext uri="{FF2B5EF4-FFF2-40B4-BE49-F238E27FC236}">
+                <a16:creationId xmlns:a16="http://schemas.microsoft.com/office/drawing/2014/main" id="{87EB0E7F-A70F-40D1-8E72-EC4A6A106225}"/>
+              </a:ext>
+            </a:extLst>
+          </p:cNvPr>
+          <p:cNvSpPr>
+            <a:spLocks noGrp="1"/>
+          </p:cNvSpPr>
+          <p:nvPr>
+            <p:ph idx="1"/>
+          </p:nvPr>
+        </p:nvSpPr>
+        <p:spPr/>
+        <p:txBody>
+          <a:bodyPr/>
+          <a:lstStyle/>
+          <a:p>
+            <a:endParaRPr lang="en-GB"/>
+          </a:p>
+        </p:txBody>
+      </p:sp>
+      <p:sp>
+        <p:nvSpPr>
+          <p:cNvPr id="4" name="Segnaposto data 3">
+            <a:extLst>
+              <a:ext uri="{FF2B5EF4-FFF2-40B4-BE49-F238E27FC236}">
+                <a16:creationId xmlns:a16="http://schemas.microsoft.com/office/drawing/2014/main" id="{CD37FF21-5647-48BC-ABE0-22F8AB863E52}"/>
+              </a:ext>
+            </a:extLst>
+          </p:cNvPr>
+          <p:cNvSpPr>
+            <a:spLocks noGrp="1"/>
+          </p:cNvSpPr>
+          <p:nvPr>
+            <p:ph type="dt" sz="half" idx="10"/>
+          </p:nvPr>
+        </p:nvSpPr>
+        <p:spPr>
+          <a:xfrm>
+            <a:off x="411891" y="6361329"/>
+            <a:ext cx="2558835" cy="365125"/>
+          </a:xfrm>
+        </p:spPr>
+        <p:txBody>
+          <a:bodyPr/>
+          <a:lstStyle/>
+          <a:p>
+            <a:r>
+              <a:rPr lang="en-US" dirty="0"/>
+              <a:t>Initial Setup – Pierluigi Zama Ramirez</a:t>
+            </a:r>
+          </a:p>
+        </p:txBody>
+      </p:sp>
+      <p:sp>
+        <p:nvSpPr>
+          <p:cNvPr id="5" name="Segnaposto numero diapositiva 4">
+            <a:extLst>
+              <a:ext uri="{FF2B5EF4-FFF2-40B4-BE49-F238E27FC236}">
+                <a16:creationId xmlns:a16="http://schemas.microsoft.com/office/drawing/2014/main" id="{1B67C968-09C6-409E-9094-6A61912F818E}"/>
+              </a:ext>
+            </a:extLst>
+          </p:cNvPr>
+          <p:cNvSpPr>
+            <a:spLocks noGrp="1"/>
+          </p:cNvSpPr>
+          <p:nvPr>
+            <p:ph type="sldNum" sz="quarter" idx="12"/>
+          </p:nvPr>
+        </p:nvSpPr>
+        <p:spPr/>
+        <p:txBody>
+          <a:bodyPr/>
+          <a:lstStyle/>
+          <a:p>
+            <a:fld id="{21D15A9C-11B4-4C77-BDEA-04E3D7D1DFC0}" type="slidenum">
+              <a:rPr lang="en-US" smtClean="0"/>
+              <a:t>8</a:t>
+            </a:fld>
+            <a:endParaRPr lang="en-US"/>
+          </a:p>
+        </p:txBody>
+      </p:sp>
+    </p:spTree>
+    <p:extLst>
+      <p:ext uri="{BB962C8B-B14F-4D97-AF65-F5344CB8AC3E}">
+        <p14:creationId xmlns:p14="http://schemas.microsoft.com/office/powerpoint/2010/main" val="2993606909"/>
+      </p:ext>
+    </p:extLst>
+  </p:cSld>
+  <p:clrMapOvr>
+    <a:masterClrMapping/>
+  </p:clrMapOvr>
+</p:sld>
+</file>
+
+<file path=ppt/slides/slide9.xml><?xml version="1.0" encoding="utf-8"?>
+<p:sld xmlns:a="http://schemas.openxmlformats.org/drawingml/2006/main" xmlns:r="http://schemas.openxmlformats.org/officeDocument/2006/relationships" xmlns:p="http://schemas.openxmlformats.org/presentationml/2006/main">
+  <p:cSld>
+    <p:spTree>
+      <p:nvGrpSpPr>
+        <p:cNvPr id="1" name=""/>
+        <p:cNvGrpSpPr/>
+        <p:nvPr/>
+      </p:nvGrpSpPr>
+      <p:grpSpPr>
+        <a:xfrm>
+          <a:off x="0" y="0"/>
+          <a:ext cx="0" cy="0"/>
+          <a:chOff x="0" y="0"/>
+          <a:chExt cx="0" cy="0"/>
+        </a:xfrm>
+      </p:grpSpPr>
+      <p:sp>
+        <p:nvSpPr>
+          <p:cNvPr id="2" name="Titolo 1">
+            <a:extLst>
+              <a:ext uri="{FF2B5EF4-FFF2-40B4-BE49-F238E27FC236}">
+                <a16:creationId xmlns:a16="http://schemas.microsoft.com/office/drawing/2014/main" id="{C2425517-4760-4CAE-AE51-2926BAC8F809}"/>
+              </a:ext>
+            </a:extLst>
+          </p:cNvPr>
+          <p:cNvSpPr>
+            <a:spLocks noGrp="1"/>
+          </p:cNvSpPr>
+          <p:nvPr>
+            <p:ph type="title"/>
+          </p:nvPr>
+        </p:nvSpPr>
+        <p:spPr/>
+        <p:txBody>
+          <a:bodyPr/>
+          <a:lstStyle/>
+          <a:p>
+            <a:endParaRPr lang="en-GB" dirty="0"/>
+          </a:p>
+        </p:txBody>
+      </p:sp>
+      <p:sp>
+        <p:nvSpPr>
+          <p:cNvPr id="3" name="Segnaposto contenuto 2">
+            <a:extLst>
+              <a:ext uri="{FF2B5EF4-FFF2-40B4-BE49-F238E27FC236}">
+                <a16:creationId xmlns:a16="http://schemas.microsoft.com/office/drawing/2014/main" id="{87EB0E7F-A70F-40D1-8E72-EC4A6A106225}"/>
+              </a:ext>
+            </a:extLst>
+          </p:cNvPr>
+          <p:cNvSpPr>
+            <a:spLocks noGrp="1"/>
+          </p:cNvSpPr>
+          <p:nvPr>
+            <p:ph idx="1"/>
+          </p:nvPr>
+        </p:nvSpPr>
+        <p:spPr/>
+        <p:txBody>
+          <a:bodyPr/>
+          <a:lstStyle/>
+          <a:p>
+            <a:endParaRPr lang="en-GB"/>
+          </a:p>
+        </p:txBody>
+      </p:sp>
+      <p:sp>
+        <p:nvSpPr>
+          <p:cNvPr id="4" name="Segnaposto data 3">
+            <a:extLst>
+              <a:ext uri="{FF2B5EF4-FFF2-40B4-BE49-F238E27FC236}">
+                <a16:creationId xmlns:a16="http://schemas.microsoft.com/office/drawing/2014/main" id="{CD37FF21-5647-48BC-ABE0-22F8AB863E52}"/>
+              </a:ext>
+            </a:extLst>
+          </p:cNvPr>
+          <p:cNvSpPr>
+            <a:spLocks noGrp="1"/>
+          </p:cNvSpPr>
+          <p:nvPr>
+            <p:ph type="dt" sz="half" idx="10"/>
+          </p:nvPr>
+        </p:nvSpPr>
+        <p:spPr>
+          <a:xfrm>
+            <a:off x="411891" y="6361329"/>
+            <a:ext cx="2558835" cy="365125"/>
+          </a:xfrm>
+        </p:spPr>
+        <p:txBody>
+          <a:bodyPr/>
+          <a:lstStyle/>
+          <a:p>
+            <a:r>
+              <a:rPr lang="en-US" dirty="0"/>
+              <a:t>Initial Setup – Pierluigi Zama Ramirez</a:t>
+            </a:r>
+          </a:p>
+        </p:txBody>
+      </p:sp>
+      <p:sp>
+        <p:nvSpPr>
+          <p:cNvPr id="5" name="Segnaposto numero diapositiva 4">
+            <a:extLst>
+              <a:ext uri="{FF2B5EF4-FFF2-40B4-BE49-F238E27FC236}">
+                <a16:creationId xmlns:a16="http://schemas.microsoft.com/office/drawing/2014/main" id="{1B67C968-09C6-409E-9094-6A61912F818E}"/>
+              </a:ext>
+            </a:extLst>
+          </p:cNvPr>
+          <p:cNvSpPr>
+            <a:spLocks noGrp="1"/>
+          </p:cNvSpPr>
+          <p:nvPr>
+            <p:ph type="sldNum" sz="quarter" idx="12"/>
+          </p:nvPr>
+        </p:nvSpPr>
+        <p:spPr/>
+        <p:txBody>
+          <a:bodyPr/>
+          <a:lstStyle/>
+          <a:p>
+            <a:fld id="{21D15A9C-11B4-4C77-BDEA-04E3D7D1DFC0}" type="slidenum">
+              <a:rPr lang="en-US" smtClean="0"/>
+              <a:t>9</a:t>
+            </a:fld>
+            <a:endParaRPr lang="en-US"/>
+          </a:p>
+        </p:txBody>
+      </p:sp>
+    </p:spTree>
+    <p:extLst>
+      <p:ext uri="{BB962C8B-B14F-4D97-AF65-F5344CB8AC3E}">
+        <p14:creationId xmlns:p14="http://schemas.microsoft.com/office/powerpoint/2010/main" val="3267681367"/>
       </p:ext>
     </p:extLst>
   </p:cSld>

</xml_diff>

<commit_message>
update slide 0 python3.5
</commit_message>
<xml_diff>
--- a/LabSession0 - Initial Setup.pptx
+++ b/LabSession0 - Initial Setup.pptx
@@ -247,7 +247,7 @@
           <a:p>
             <a:fld id="{2CC5598C-FF10-4AF1-BC63-A7C8964CD468}" type="datetimeFigureOut">
               <a:rPr lang="en-US" smtClean="0"/>
-              <a:t>9/26/2019</a:t>
+              <a:t>3/14/2020</a:t>
             </a:fld>
             <a:endParaRPr lang="en-US"/>
           </a:p>
@@ -9386,7 +9386,7 @@
           <a:p>
             <a:r>
               <a:rPr lang="en-GB" dirty="0"/>
-              <a:t>Python 3.x</a:t>
+              <a:t>Python 3.5.x</a:t>
             </a:r>
           </a:p>
           <a:p>
@@ -9529,7 +9529,7 @@
           <a:p>
             <a:r>
               <a:rPr lang="en-GB" dirty="0"/>
-              <a:t>Step 1: Installing Python 3.x</a:t>
+              <a:t>Step 1: Installing Python 3.5.x</a:t>
             </a:r>
           </a:p>
         </p:txBody>
@@ -9734,7 +9734,7 @@
               <a:rPr lang="en-GB" sz="1600" dirty="0">
                 <a:latin typeface="Tw Cen MT" panose="020B0602020104020603" pitchFamily="34" charset="0"/>
               </a:rPr>
-              <a:t>Download the latest Python3 release from: </a:t>
+              <a:t>Download the Python3.5.x release from: </a:t>
             </a:r>
             <a:r>
               <a:rPr lang="en-GB" sz="1600" dirty="0">

</xml_diff>